<commit_message>
Adding all the exercise code.
</commit_message>
<xml_diff>
--- a/case-study/customer-analysis.pptx
+++ b/case-study/customer-analysis.pptx
@@ -120,6 +120,11 @@
       </a:defRPr>
     </a:lvl9pPr>
   </p:defaultTextStyle>
+  <p:extLst>
+    <p:ext uri="{EFAFB233-063F-42B5-8137-9DF3F51BA10A}">
+      <p15:sldGuideLst xmlns:p15="http://schemas.microsoft.com/office/powerpoint/2012/main"/>
+    </p:ext>
+  </p:extLst>
 </p:presentation>
 </file>
 
@@ -272,7 +277,7 @@
           <a:p>
             <a:fld id="{52792395-AD41-8A42-B393-B48395BDF96A}" type="datetimeFigureOut">
               <a:rPr lang="en-US" smtClean="0"/>
-              <a:t>7/28/24</a:t>
+              <a:t>7/29/24</a:t>
             </a:fld>
             <a:endParaRPr lang="en-US"/>
           </a:p>
@@ -472,7 +477,7 @@
           <a:p>
             <a:fld id="{52792395-AD41-8A42-B393-B48395BDF96A}" type="datetimeFigureOut">
               <a:rPr lang="en-US" smtClean="0"/>
-              <a:t>7/28/24</a:t>
+              <a:t>7/29/24</a:t>
             </a:fld>
             <a:endParaRPr lang="en-US"/>
           </a:p>
@@ -682,7 +687,7 @@
           <a:p>
             <a:fld id="{52792395-AD41-8A42-B393-B48395BDF96A}" type="datetimeFigureOut">
               <a:rPr lang="en-US" smtClean="0"/>
-              <a:t>7/28/24</a:t>
+              <a:t>7/29/24</a:t>
             </a:fld>
             <a:endParaRPr lang="en-US"/>
           </a:p>
@@ -882,7 +887,7 @@
           <a:p>
             <a:fld id="{52792395-AD41-8A42-B393-B48395BDF96A}" type="datetimeFigureOut">
               <a:rPr lang="en-US" smtClean="0"/>
-              <a:t>7/28/24</a:t>
+              <a:t>7/29/24</a:t>
             </a:fld>
             <a:endParaRPr lang="en-US"/>
           </a:p>
@@ -1158,7 +1163,7 @@
           <a:p>
             <a:fld id="{52792395-AD41-8A42-B393-B48395BDF96A}" type="datetimeFigureOut">
               <a:rPr lang="en-US" smtClean="0"/>
-              <a:t>7/28/24</a:t>
+              <a:t>7/29/24</a:t>
             </a:fld>
             <a:endParaRPr lang="en-US"/>
           </a:p>
@@ -1426,7 +1431,7 @@
           <a:p>
             <a:fld id="{52792395-AD41-8A42-B393-B48395BDF96A}" type="datetimeFigureOut">
               <a:rPr lang="en-US" smtClean="0"/>
-              <a:t>7/28/24</a:t>
+              <a:t>7/29/24</a:t>
             </a:fld>
             <a:endParaRPr lang="en-US"/>
           </a:p>
@@ -1841,7 +1846,7 @@
           <a:p>
             <a:fld id="{52792395-AD41-8A42-B393-B48395BDF96A}" type="datetimeFigureOut">
               <a:rPr lang="en-US" smtClean="0"/>
-              <a:t>7/28/24</a:t>
+              <a:t>7/29/24</a:t>
             </a:fld>
             <a:endParaRPr lang="en-US"/>
           </a:p>
@@ -1983,7 +1988,7 @@
           <a:p>
             <a:fld id="{52792395-AD41-8A42-B393-B48395BDF96A}" type="datetimeFigureOut">
               <a:rPr lang="en-US" smtClean="0"/>
-              <a:t>7/28/24</a:t>
+              <a:t>7/29/24</a:t>
             </a:fld>
             <a:endParaRPr lang="en-US"/>
           </a:p>
@@ -2096,7 +2101,7 @@
           <a:p>
             <a:fld id="{52792395-AD41-8A42-B393-B48395BDF96A}" type="datetimeFigureOut">
               <a:rPr lang="en-US" smtClean="0"/>
-              <a:t>7/28/24</a:t>
+              <a:t>7/29/24</a:t>
             </a:fld>
             <a:endParaRPr lang="en-US"/>
           </a:p>
@@ -2409,7 +2414,7 @@
           <a:p>
             <a:fld id="{52792395-AD41-8A42-B393-B48395BDF96A}" type="datetimeFigureOut">
               <a:rPr lang="en-US" smtClean="0"/>
-              <a:t>7/28/24</a:t>
+              <a:t>7/29/24</a:t>
             </a:fld>
             <a:endParaRPr lang="en-US"/>
           </a:p>
@@ -2698,7 +2703,7 @@
           <a:p>
             <a:fld id="{52792395-AD41-8A42-B393-B48395BDF96A}" type="datetimeFigureOut">
               <a:rPr lang="en-US" smtClean="0"/>
-              <a:t>7/28/24</a:t>
+              <a:t>7/29/24</a:t>
             </a:fld>
             <a:endParaRPr lang="en-US"/>
           </a:p>
@@ -2941,7 +2946,7 @@
           <a:p>
             <a:fld id="{52792395-AD41-8A42-B393-B48395BDF96A}" type="datetimeFigureOut">
               <a:rPr lang="en-US" smtClean="0"/>
-              <a:t>7/28/24</a:t>
+              <a:t>7/29/24</a:t>
             </a:fld>
             <a:endParaRPr lang="en-US"/>
           </a:p>
@@ -7106,7 +7111,7 @@
         </p:blipFill>
         <p:spPr>
           <a:xfrm>
-            <a:off x="838200" y="2065695"/>
+            <a:off x="838199" y="1360273"/>
             <a:ext cx="4724400" cy="3873500"/>
           </a:xfrm>
           <a:prstGeom prst="rect">
@@ -7128,8 +7133,8 @@
         </p:nvSpPr>
         <p:spPr>
           <a:xfrm>
-            <a:off x="6096000" y="3263781"/>
-            <a:ext cx="5956567" cy="2308324"/>
+            <a:off x="1129897" y="5705028"/>
+            <a:ext cx="4141005" cy="1015663"/>
           </a:xfrm>
           <a:prstGeom prst="rect">
             <a:avLst/>
@@ -7147,18 +7152,18 @@
               <a:buChar char="•"/>
             </a:pPr>
             <a:r>
-              <a:rPr lang="en-US" dirty="0"/>
+              <a:rPr lang="en-US" sz="1200" dirty="0"/>
               <a:t>Analyzing ~34k records indicates the Charged-Off loans</a:t>
             </a:r>
           </a:p>
           <a:p>
             <a:r>
-              <a:rPr lang="en-US" dirty="0"/>
+              <a:rPr lang="en-US" sz="1200" dirty="0"/>
               <a:t>constitutes  around ~14% of all the loans disbursed.</a:t>
             </a:r>
           </a:p>
           <a:p>
-            <a:endParaRPr lang="en-US" dirty="0"/>
+            <a:endParaRPr lang="en-US" sz="1200" dirty="0"/>
           </a:p>
           <a:p>
             <a:pPr marL="285750" indent="-285750">
@@ -7166,24 +7171,195 @@
               <a:buChar char="•"/>
             </a:pPr>
             <a:r>
-              <a:rPr lang="en-US" dirty="0"/>
+              <a:rPr lang="en-US" sz="1200" dirty="0"/>
               <a:t>Univariate Analysis of all the records to be performed </a:t>
             </a:r>
           </a:p>
           <a:p>
             <a:r>
-              <a:rPr lang="en-US" dirty="0"/>
-              <a:t>taking this proportion as the benchmark  </a:t>
-            </a:r>
-          </a:p>
-          <a:p>
-            <a:endParaRPr lang="en-US" dirty="0"/>
-          </a:p>
-          <a:p>
-            <a:endParaRPr lang="en-US" dirty="0"/>
-          </a:p>
-          <a:p>
-            <a:endParaRPr lang="en-US" dirty="0"/>
+              <a:rPr lang="en-US" sz="1200" dirty="0"/>
+              <a:t>taking this proportion as the benchmark.</a:t>
+            </a:r>
+          </a:p>
+        </p:txBody>
+      </p:sp>
+      <p:pic>
+        <p:nvPicPr>
+          <p:cNvPr id="3" name="Picture 2" descr="Distribution of Principal Recovery Ratio across Charged Off Loans">
+            <a:extLst>
+              <a:ext uri="{FF2B5EF4-FFF2-40B4-BE49-F238E27FC236}">
+                <a16:creationId xmlns:a16="http://schemas.microsoft.com/office/drawing/2014/main" id="{129663CA-7203-5A63-6A3D-0CE089D3082B}"/>
+              </a:ext>
+            </a:extLst>
+          </p:cNvPr>
+          <p:cNvPicPr>
+            <a:picLocks noChangeAspect="1"/>
+          </p:cNvPicPr>
+          <p:nvPr/>
+        </p:nvPicPr>
+        <p:blipFill>
+          <a:blip r:embed="rId3"/>
+          <a:stretch>
+            <a:fillRect/>
+          </a:stretch>
+        </p:blipFill>
+        <p:spPr>
+          <a:xfrm>
+            <a:off x="7471455" y="1228298"/>
+            <a:ext cx="4453844" cy="4137451"/>
+          </a:xfrm>
+          <a:prstGeom prst="rect">
+            <a:avLst/>
+          </a:prstGeom>
+        </p:spPr>
+      </p:pic>
+      <p:sp>
+        <p:nvSpPr>
+          <p:cNvPr id="5" name="TextBox 4">
+            <a:extLst>
+              <a:ext uri="{FF2B5EF4-FFF2-40B4-BE49-F238E27FC236}">
+                <a16:creationId xmlns:a16="http://schemas.microsoft.com/office/drawing/2014/main" id="{D3A2607E-599A-E0FF-DFEA-9B1E3002EE00}"/>
+              </a:ext>
+            </a:extLst>
+          </p:cNvPr>
+          <p:cNvSpPr txBox="1"/>
+          <p:nvPr/>
+        </p:nvSpPr>
+        <p:spPr>
+          <a:xfrm>
+            <a:off x="7647784" y="5705029"/>
+            <a:ext cx="4101187" cy="1015663"/>
+          </a:xfrm>
+          <a:prstGeom prst="rect">
+            <a:avLst/>
+          </a:prstGeom>
+          <a:noFill/>
+        </p:spPr>
+        <p:txBody>
+          <a:bodyPr wrap="none" rtlCol="0">
+            <a:spAutoFit/>
+          </a:bodyPr>
+          <a:lstStyle/>
+          <a:p>
+            <a:pPr marL="285750" indent="-285750">
+              <a:buFont typeface="Arial" panose="020B0604020202020204" pitchFamily="34" charset="0"/>
+              <a:buChar char="•"/>
+            </a:pPr>
+            <a:r>
+              <a:rPr lang="en-US" sz="1200" dirty="0"/>
+              <a:t>Around </a:t>
+            </a:r>
+            <a:r>
+              <a:rPr lang="en-US" sz="1200" b="1" dirty="0"/>
+              <a:t>~70% </a:t>
+            </a:r>
+            <a:r>
+              <a:rPr lang="en-US" sz="1200" dirty="0"/>
+              <a:t>of the charged-off loans ends up paying </a:t>
+            </a:r>
+          </a:p>
+          <a:p>
+            <a:r>
+              <a:rPr lang="en-US" sz="1200" dirty="0"/>
+              <a:t> </a:t>
+            </a:r>
+            <a:r>
+              <a:rPr lang="en-US" sz="1200" b="1" dirty="0"/>
+              <a:t>&lt; 50%</a:t>
+            </a:r>
+            <a:r>
+              <a:rPr lang="en-US" sz="1200" dirty="0"/>
+              <a:t> of the principal</a:t>
+            </a:r>
+          </a:p>
+          <a:p>
+            <a:endParaRPr lang="en-US" sz="1200" dirty="0"/>
+          </a:p>
+          <a:p>
+            <a:pPr marL="285750" indent="-285750">
+              <a:buFont typeface="Arial" panose="020B0604020202020204" pitchFamily="34" charset="0"/>
+              <a:buChar char="•"/>
+            </a:pPr>
+            <a:r>
+              <a:rPr lang="en-US" sz="1200" dirty="0"/>
+              <a:t>Analyzing the customer and loan attributes that affects</a:t>
+            </a:r>
+          </a:p>
+          <a:p>
+            <a:r>
+              <a:rPr lang="en-US" sz="1200" dirty="0"/>
+              <a:t>the payment of loan based on Principal Recovery Ratio</a:t>
+            </a:r>
+          </a:p>
+        </p:txBody>
+      </p:sp>
+      <p:sp>
+        <p:nvSpPr>
+          <p:cNvPr id="8" name="TextBox 7">
+            <a:extLst>
+              <a:ext uri="{FF2B5EF4-FFF2-40B4-BE49-F238E27FC236}">
+                <a16:creationId xmlns:a16="http://schemas.microsoft.com/office/drawing/2014/main" id="{1252FAC9-DB83-433D-E5FD-C57D4CAAA2B6}"/>
+              </a:ext>
+            </a:extLst>
+          </p:cNvPr>
+          <p:cNvSpPr txBox="1"/>
+          <p:nvPr/>
+        </p:nvSpPr>
+        <p:spPr>
+          <a:xfrm>
+            <a:off x="7789965" y="5346289"/>
+            <a:ext cx="3959006" cy="246221"/>
+          </a:xfrm>
+          <a:prstGeom prst="rect">
+            <a:avLst/>
+          </a:prstGeom>
+          <a:noFill/>
+        </p:spPr>
+        <p:txBody>
+          <a:bodyPr wrap="square">
+            <a:spAutoFit/>
+          </a:bodyPr>
+          <a:lstStyle/>
+          <a:p>
+            <a:r>
+              <a:rPr lang="en-US" sz="1000" b="1" dirty="0"/>
+              <a:t>Distribution of Principal Recovery Ratio across Charged Off Loans</a:t>
+            </a:r>
+          </a:p>
+        </p:txBody>
+      </p:sp>
+      <p:sp>
+        <p:nvSpPr>
+          <p:cNvPr id="10" name="TextBox 9">
+            <a:extLst>
+              <a:ext uri="{FF2B5EF4-FFF2-40B4-BE49-F238E27FC236}">
+                <a16:creationId xmlns:a16="http://schemas.microsoft.com/office/drawing/2014/main" id="{D36B3A5C-9CE5-1281-F214-BBC083063A21}"/>
+              </a:ext>
+            </a:extLst>
+          </p:cNvPr>
+          <p:cNvSpPr txBox="1"/>
+          <p:nvPr/>
+        </p:nvSpPr>
+        <p:spPr>
+          <a:xfrm>
+            <a:off x="1983473" y="5346290"/>
+            <a:ext cx="2560744" cy="246221"/>
+          </a:xfrm>
+          <a:prstGeom prst="rect">
+            <a:avLst/>
+          </a:prstGeom>
+          <a:noFill/>
+        </p:spPr>
+        <p:txBody>
+          <a:bodyPr wrap="square">
+            <a:spAutoFit/>
+          </a:bodyPr>
+          <a:lstStyle/>
+          <a:p>
+            <a:r>
+              <a:rPr lang="en-US" sz="1000" b="1" dirty="0"/>
+              <a:t>Distribution of Loan Status across Loans</a:t>
+            </a:r>
           </a:p>
         </p:txBody>
       </p:sp>

</xml_diff>